<commit_message>
adding jupyter notebook install instructions
</commit_message>
<xml_diff>
--- a/Part.1_VersionControl/Module1.Github.pptx
+++ b/Part.1_VersionControl/Module1.Github.pptx
@@ -5,7 +5,7 @@
     <p:sldMasterId id="2147483648" r:id="rId1"/>
   </p:sldMasterIdLst>
   <p:notesMasterIdLst>
-    <p:notesMasterId r:id="rId40"/>
+    <p:notesMasterId r:id="rId41"/>
   </p:notesMasterIdLst>
   <p:sldIdLst>
     <p:sldId id="261" r:id="rId2"/>
@@ -46,6 +46,7 @@
     <p:sldId id="317" r:id="rId37"/>
     <p:sldId id="318" r:id="rId38"/>
     <p:sldId id="319" r:id="rId39"/>
+    <p:sldId id="320" r:id="rId40"/>
   </p:sldIdLst>
   <p:sldSz cx="12192000" cy="6858000"/>
   <p:notesSz cx="6858000" cy="9144000"/>
@@ -1358,6 +1359,90 @@
     <p:extLst>
       <p:ext uri="{BB962C8B-B14F-4D97-AF65-F5344CB8AC3E}">
         <p14:creationId xmlns:p14="http://schemas.microsoft.com/office/powerpoint/2010/main" val="1307056176"/>
+      </p:ext>
+    </p:extLst>
+  </p:cSld>
+  <p:clrMapOvr>
+    <a:masterClrMapping/>
+  </p:clrMapOvr>
+</p:notes>
+</file>
+
+<file path=ppt/notesSlides/notesSlide18.xml><?xml version="1.0" encoding="utf-8"?>
+<p:notes xmlns:a="http://schemas.openxmlformats.org/drawingml/2006/main" xmlns:r="http://schemas.openxmlformats.org/officeDocument/2006/relationships" xmlns:p="http://schemas.openxmlformats.org/presentationml/2006/main">
+  <p:cSld>
+    <p:spTree>
+      <p:nvGrpSpPr>
+        <p:cNvPr id="1" name=""/>
+        <p:cNvGrpSpPr/>
+        <p:nvPr/>
+      </p:nvGrpSpPr>
+      <p:grpSpPr>
+        <a:xfrm>
+          <a:off x="0" y="0"/>
+          <a:ext cx="0" cy="0"/>
+          <a:chOff x="0" y="0"/>
+          <a:chExt cx="0" cy="0"/>
+        </a:xfrm>
+      </p:grpSpPr>
+      <p:sp>
+        <p:nvSpPr>
+          <p:cNvPr id="2" name="Slide Image Placeholder 1"/>
+          <p:cNvSpPr>
+            <a:spLocks noGrp="1" noRot="1" noChangeAspect="1"/>
+          </p:cNvSpPr>
+          <p:nvPr>
+            <p:ph type="sldImg"/>
+          </p:nvPr>
+        </p:nvSpPr>
+        <p:spPr/>
+      </p:sp>
+      <p:sp>
+        <p:nvSpPr>
+          <p:cNvPr id="3" name="Notes Placeholder 2"/>
+          <p:cNvSpPr>
+            <a:spLocks noGrp="1"/>
+          </p:cNvSpPr>
+          <p:nvPr>
+            <p:ph type="body" idx="1"/>
+          </p:nvPr>
+        </p:nvSpPr>
+        <p:spPr/>
+        <p:txBody>
+          <a:bodyPr/>
+          <a:lstStyle/>
+          <a:p>
+            <a:endParaRPr lang="en-US"/>
+          </a:p>
+        </p:txBody>
+      </p:sp>
+      <p:sp>
+        <p:nvSpPr>
+          <p:cNvPr id="4" name="Slide Number Placeholder 3"/>
+          <p:cNvSpPr>
+            <a:spLocks noGrp="1"/>
+          </p:cNvSpPr>
+          <p:nvPr>
+            <p:ph type="sldNum" sz="quarter" idx="5"/>
+          </p:nvPr>
+        </p:nvSpPr>
+        <p:spPr/>
+        <p:txBody>
+          <a:bodyPr/>
+          <a:lstStyle/>
+          <a:p>
+            <a:fld id="{D8AA95F1-B34D-6E45-932E-4B30FC9A06E3}" type="slidenum">
+              <a:rPr lang="en-US" smtClean="0"/>
+              <a:t>39</a:t>
+            </a:fld>
+            <a:endParaRPr lang="en-US"/>
+          </a:p>
+        </p:txBody>
+      </p:sp>
+    </p:spTree>
+    <p:extLst>
+      <p:ext uri="{BB962C8B-B14F-4D97-AF65-F5344CB8AC3E}">
+        <p14:creationId xmlns:p14="http://schemas.microsoft.com/office/powerpoint/2010/main" val="1263420977"/>
       </p:ext>
     </p:extLst>
   </p:cSld>
@@ -18987,6 +19072,206 @@
     <p:extLst>
       <p:ext uri="{BB962C8B-B14F-4D97-AF65-F5344CB8AC3E}">
         <p14:creationId xmlns:p14="http://schemas.microsoft.com/office/powerpoint/2010/main" val="2338572711"/>
+      </p:ext>
+    </p:extLst>
+  </p:cSld>
+  <p:clrMapOvr>
+    <a:masterClrMapping/>
+  </p:clrMapOvr>
+</p:sld>
+</file>
+
+<file path=ppt/slides/slide39.xml><?xml version="1.0" encoding="utf-8"?>
+<p:sld xmlns:a="http://schemas.openxmlformats.org/drawingml/2006/main" xmlns:r="http://schemas.openxmlformats.org/officeDocument/2006/relationships" xmlns:p="http://schemas.openxmlformats.org/presentationml/2006/main">
+  <p:cSld>
+    <p:spTree>
+      <p:nvGrpSpPr>
+        <p:cNvPr id="1" name=""/>
+        <p:cNvGrpSpPr/>
+        <p:nvPr/>
+      </p:nvGrpSpPr>
+      <p:grpSpPr>
+        <a:xfrm>
+          <a:off x="0" y="0"/>
+          <a:ext cx="0" cy="0"/>
+          <a:chOff x="0" y="0"/>
+          <a:chExt cx="0" cy="0"/>
+        </a:xfrm>
+      </p:grpSpPr>
+      <p:sp>
+        <p:nvSpPr>
+          <p:cNvPr id="2" name="Title 1">
+            <a:extLst>
+              <a:ext uri="{FF2B5EF4-FFF2-40B4-BE49-F238E27FC236}">
+                <a16:creationId xmlns:a16="http://schemas.microsoft.com/office/drawing/2014/main" id="{7E06A112-782C-5546-AD87-E4CF67338D91}"/>
+              </a:ext>
+            </a:extLst>
+          </p:cNvPr>
+          <p:cNvSpPr>
+            <a:spLocks noGrp="1"/>
+          </p:cNvSpPr>
+          <p:nvPr>
+            <p:ph type="title"/>
+          </p:nvPr>
+        </p:nvSpPr>
+        <p:spPr/>
+        <p:txBody>
+          <a:bodyPr/>
+          <a:lstStyle/>
+          <a:p>
+            <a:r>
+              <a:rPr lang="en-US" dirty="0"/>
+              <a:t>For Tuesday – Install </a:t>
+            </a:r>
+            <a:r>
+              <a:rPr lang="en-US" dirty="0" err="1"/>
+              <a:t>Jupyter</a:t>
+            </a:r>
+            <a:r>
+              <a:rPr lang="en-US" dirty="0"/>
+              <a:t> Notebooks</a:t>
+            </a:r>
+          </a:p>
+        </p:txBody>
+      </p:sp>
+      <p:sp>
+        <p:nvSpPr>
+          <p:cNvPr id="3" name="Content Placeholder 2">
+            <a:extLst>
+              <a:ext uri="{FF2B5EF4-FFF2-40B4-BE49-F238E27FC236}">
+                <a16:creationId xmlns:a16="http://schemas.microsoft.com/office/drawing/2014/main" id="{0D95DA1F-FBA3-B742-B1ED-6A672D3D53E9}"/>
+              </a:ext>
+            </a:extLst>
+          </p:cNvPr>
+          <p:cNvSpPr>
+            <a:spLocks noGrp="1"/>
+          </p:cNvSpPr>
+          <p:nvPr>
+            <p:ph idx="1"/>
+          </p:nvPr>
+        </p:nvSpPr>
+        <p:spPr/>
+        <p:txBody>
+          <a:bodyPr/>
+          <a:lstStyle/>
+          <a:p>
+            <a:r>
+              <a:rPr lang="en-US" dirty="0"/>
+              <a:t>Here is an overview of notebooks – read the install part</a:t>
+            </a:r>
+          </a:p>
+          <a:p>
+            <a:pPr lvl="1"/>
+            <a:r>
+              <a:rPr lang="en-US" dirty="0"/>
+              <a:t>https://</a:t>
+            </a:r>
+            <a:r>
+              <a:rPr lang="en-US" dirty="0" err="1"/>
+              <a:t>programminghistorian.org</a:t>
+            </a:r>
+            <a:r>
+              <a:rPr lang="en-US" dirty="0"/>
+              <a:t>/</a:t>
+            </a:r>
+            <a:r>
+              <a:rPr lang="en-US" dirty="0" err="1"/>
+              <a:t>en</a:t>
+            </a:r>
+            <a:r>
+              <a:rPr lang="en-US" dirty="0"/>
+              <a:t>/lessons/</a:t>
+            </a:r>
+            <a:r>
+              <a:rPr lang="en-US" dirty="0" err="1"/>
+              <a:t>jupyter</a:t>
+            </a:r>
+            <a:r>
+              <a:rPr lang="en-US" dirty="0"/>
+              <a:t>-notebooks </a:t>
+            </a:r>
+          </a:p>
+          <a:p>
+            <a:r>
+              <a:rPr lang="en-US" dirty="0"/>
+              <a:t>Easiest way is through Anaconda install</a:t>
+            </a:r>
+          </a:p>
+          <a:p>
+            <a:pPr lvl="1"/>
+            <a:r>
+              <a:rPr lang="en-US" dirty="0">
+                <a:hlinkClick r:id="rId3"/>
+              </a:rPr>
+              <a:t>https://www.anaconda.com/products/individual</a:t>
+            </a:r>
+            <a:endParaRPr lang="en-US" dirty="0"/>
+          </a:p>
+          <a:p>
+            <a:r>
+              <a:rPr lang="en-US" dirty="0"/>
+              <a:t>Mac if you want to be hardcore and do it through the terminal</a:t>
+            </a:r>
+          </a:p>
+          <a:p>
+            <a:pPr lvl="1"/>
+            <a:r>
+              <a:rPr lang="en-US" dirty="0">
+                <a:latin typeface="Courier New" panose="02070309020205020404" pitchFamily="49" charset="0"/>
+                <a:cs typeface="Courier New" panose="02070309020205020404" pitchFamily="49" charset="0"/>
+              </a:rPr>
+              <a:t>$pip3 install </a:t>
+            </a:r>
+            <a:r>
+              <a:rPr lang="en-US" dirty="0" err="1">
+                <a:latin typeface="Courier New" panose="02070309020205020404" pitchFamily="49" charset="0"/>
+                <a:cs typeface="Courier New" panose="02070309020205020404" pitchFamily="49" charset="0"/>
+              </a:rPr>
+              <a:t>jupyter</a:t>
+            </a:r>
+            <a:endParaRPr lang="en-US" dirty="0">
+              <a:latin typeface="Courier New" panose="02070309020205020404" pitchFamily="49" charset="0"/>
+              <a:cs typeface="Courier New" panose="02070309020205020404" pitchFamily="49" charset="0"/>
+            </a:endParaRPr>
+          </a:p>
+          <a:p>
+            <a:r>
+              <a:rPr lang="en-US" dirty="0">
+                <a:cs typeface="Courier New" panose="02070309020205020404" pitchFamily="49" charset="0"/>
+              </a:rPr>
+              <a:t>To run it</a:t>
+            </a:r>
+          </a:p>
+          <a:p>
+            <a:pPr lvl="1"/>
+            <a:r>
+              <a:rPr lang="en-US" dirty="0">
+                <a:latin typeface="Courier New" panose="02070309020205020404" pitchFamily="49" charset="0"/>
+                <a:cs typeface="Courier New" panose="02070309020205020404" pitchFamily="49" charset="0"/>
+              </a:rPr>
+              <a:t>$</a:t>
+            </a:r>
+            <a:r>
+              <a:rPr lang="en-US" dirty="0" err="1">
+                <a:latin typeface="Courier New" panose="02070309020205020404" pitchFamily="49" charset="0"/>
+                <a:cs typeface="Courier New" panose="02070309020205020404" pitchFamily="49" charset="0"/>
+              </a:rPr>
+              <a:t>jupyter</a:t>
+            </a:r>
+            <a:r>
+              <a:rPr lang="en-US" dirty="0">
+                <a:latin typeface="Courier New" panose="02070309020205020404" pitchFamily="49" charset="0"/>
+                <a:cs typeface="Courier New" panose="02070309020205020404" pitchFamily="49" charset="0"/>
+              </a:rPr>
+              <a:t> notebook</a:t>
+            </a:r>
+          </a:p>
+        </p:txBody>
+      </p:sp>
+    </p:spTree>
+    <p:extLst>
+      <p:ext uri="{BB962C8B-B14F-4D97-AF65-F5344CB8AC3E}">
+        <p14:creationId xmlns:p14="http://schemas.microsoft.com/office/powerpoint/2010/main" val="604110130"/>
       </p:ext>
     </p:extLst>
   </p:cSld>

</xml_diff>